<commit_message>
Teoria de Compiladores - Formalismo e Ling formais
</commit_message>
<xml_diff>
--- a/01 Classes/Aula 01 Teoria de Compiladores.pptx
+++ b/01 Classes/Aula 01 Teoria de Compiladores.pptx
@@ -12434,17 +12434,17 @@
                 <a:latin typeface="Times New Roman" panose="02020603050405020304" pitchFamily="18" charset="0"/>
                 <a:cs typeface="Times New Roman" panose="02020603050405020304" pitchFamily="18" charset="0"/>
               </a:rPr>
-              <a:t> de venda, semáforos, lavadora de roupas, </a:t>
-            </a:r>
-            <a:r>
-              <a:rPr lang="pt-BR" dirty="0" err="1">
-                <a:solidFill>
-                  <a:schemeClr val="tx1"/>
-                </a:solidFill>
-                <a:latin typeface="Times New Roman" panose="02020603050405020304" pitchFamily="18" charset="0"/>
-                <a:cs typeface="Times New Roman" panose="02020603050405020304" pitchFamily="18" charset="0"/>
-              </a:rPr>
-              <a:t>etc</a:t>
+              <a:t> de venda, semáforos, lavadora de roupas</a:t>
+            </a:r>
+            <a:r>
+              <a:rPr lang="pt-BR">
+                <a:solidFill>
+                  <a:schemeClr val="tx1"/>
+                </a:solidFill>
+                <a:latin typeface="Times New Roman" panose="02020603050405020304" pitchFamily="18" charset="0"/>
+                <a:cs typeface="Times New Roman" panose="02020603050405020304" pitchFamily="18" charset="0"/>
+              </a:rPr>
+              <a:t>, etc.</a:t>
             </a:r>
             <a:endParaRPr lang="pt-BR" dirty="0">
               <a:solidFill>

</xml_diff>